<commit_message>
:pencil:,Made slight changes, updates, :electron:my writeupk
</commit_message>
<xml_diff>
--- a/pptx.pptx
+++ b/pptx.pptx
@@ -136,7 +136,7 @@
           <p:cNvPr id="2" name="Title 1">
             <a:extLst>
               <a:ext uri="{FF2B5EF4-FFF2-40B4-BE49-F238E27FC236}">
-                <a16:creationId xmlns:a16="http://schemas.microsoft.com/office/drawing/2014/main" id="{46B6636D-54F6-451E-92C5-BB1114CEEF50}"/>
+                <a16:creationId xmlns:a16="http://schemas.microsoft.com/office/drawing/2014/main" xmlns="" id="{46B6636D-54F6-451E-92C5-BB1114CEEF50}"/>
               </a:ext>
             </a:extLst>
           </p:cNvPr>
@@ -173,7 +173,7 @@
           <p:cNvPr id="3" name="Subtitle 2">
             <a:extLst>
               <a:ext uri="{FF2B5EF4-FFF2-40B4-BE49-F238E27FC236}">
-                <a16:creationId xmlns:a16="http://schemas.microsoft.com/office/drawing/2014/main" id="{FBE6B0AD-DEF0-4ADD-A5BA-C11097FD5767}"/>
+                <a16:creationId xmlns:a16="http://schemas.microsoft.com/office/drawing/2014/main" xmlns="" id="{FBE6B0AD-DEF0-4ADD-A5BA-C11097FD5767}"/>
               </a:ext>
             </a:extLst>
           </p:cNvPr>
@@ -243,7 +243,7 @@
           <p:cNvPr id="4" name="Date Placeholder 3">
             <a:extLst>
               <a:ext uri="{FF2B5EF4-FFF2-40B4-BE49-F238E27FC236}">
-                <a16:creationId xmlns:a16="http://schemas.microsoft.com/office/drawing/2014/main" id="{F29FD7D9-C0B2-4F01-A611-2C723B6889FD}"/>
+                <a16:creationId xmlns:a16="http://schemas.microsoft.com/office/drawing/2014/main" xmlns="" id="{F29FD7D9-C0B2-4F01-A611-2C723B6889FD}"/>
               </a:ext>
             </a:extLst>
           </p:cNvPr>
@@ -261,7 +261,7 @@
           <a:p>
             <a:fld id="{BC6D784A-583B-48B5-A7BC-BB401D5EE48B}" type="datetimeFigureOut">
               <a:rPr lang="en-US" smtClean="0"/>
-              <a:t>3/10/2021</a:t>
+              <a:t>5/19/2021</a:t>
             </a:fld>
             <a:endParaRPr lang="en-US"/>
           </a:p>
@@ -272,7 +272,7 @@
           <p:cNvPr id="5" name="Footer Placeholder 4">
             <a:extLst>
               <a:ext uri="{FF2B5EF4-FFF2-40B4-BE49-F238E27FC236}">
-                <a16:creationId xmlns:a16="http://schemas.microsoft.com/office/drawing/2014/main" id="{1643BB64-2DBB-4989-AB82-5E439F9303AD}"/>
+                <a16:creationId xmlns:a16="http://schemas.microsoft.com/office/drawing/2014/main" xmlns="" id="{1643BB64-2DBB-4989-AB82-5E439F9303AD}"/>
               </a:ext>
             </a:extLst>
           </p:cNvPr>
@@ -297,7 +297,7 @@
           <p:cNvPr id="6" name="Slide Number Placeholder 5">
             <a:extLst>
               <a:ext uri="{FF2B5EF4-FFF2-40B4-BE49-F238E27FC236}">
-                <a16:creationId xmlns:a16="http://schemas.microsoft.com/office/drawing/2014/main" id="{7B3412CD-2605-4CC9-8396-614FE66340A4}"/>
+                <a16:creationId xmlns:a16="http://schemas.microsoft.com/office/drawing/2014/main" xmlns="" id="{7B3412CD-2605-4CC9-8396-614FE66340A4}"/>
               </a:ext>
             </a:extLst>
           </p:cNvPr>
@@ -356,7 +356,7 @@
           <p:cNvPr id="2" name="Title 1">
             <a:extLst>
               <a:ext uri="{FF2B5EF4-FFF2-40B4-BE49-F238E27FC236}">
-                <a16:creationId xmlns:a16="http://schemas.microsoft.com/office/drawing/2014/main" id="{490FCD03-BD66-4721-8591-AFB5C15C7AD1}"/>
+                <a16:creationId xmlns:a16="http://schemas.microsoft.com/office/drawing/2014/main" xmlns="" id="{490FCD03-BD66-4721-8591-AFB5C15C7AD1}"/>
               </a:ext>
             </a:extLst>
           </p:cNvPr>
@@ -384,7 +384,7 @@
           <p:cNvPr id="3" name="Vertical Text Placeholder 2">
             <a:extLst>
               <a:ext uri="{FF2B5EF4-FFF2-40B4-BE49-F238E27FC236}">
-                <a16:creationId xmlns:a16="http://schemas.microsoft.com/office/drawing/2014/main" id="{7893A0EA-7995-4BB5-BB54-23E9927486E5}"/>
+                <a16:creationId xmlns:a16="http://schemas.microsoft.com/office/drawing/2014/main" xmlns="" id="{7893A0EA-7995-4BB5-BB54-23E9927486E5}"/>
               </a:ext>
             </a:extLst>
           </p:cNvPr>
@@ -441,7 +441,7 @@
           <p:cNvPr id="4" name="Date Placeholder 3">
             <a:extLst>
               <a:ext uri="{FF2B5EF4-FFF2-40B4-BE49-F238E27FC236}">
-                <a16:creationId xmlns:a16="http://schemas.microsoft.com/office/drawing/2014/main" id="{CB2C5E7B-3891-4239-885F-E3F5660F26C9}"/>
+                <a16:creationId xmlns:a16="http://schemas.microsoft.com/office/drawing/2014/main" xmlns="" id="{CB2C5E7B-3891-4239-885F-E3F5660F26C9}"/>
               </a:ext>
             </a:extLst>
           </p:cNvPr>
@@ -459,7 +459,7 @@
           <a:p>
             <a:fld id="{BC6D784A-583B-48B5-A7BC-BB401D5EE48B}" type="datetimeFigureOut">
               <a:rPr lang="en-US" smtClean="0"/>
-              <a:t>3/10/2021</a:t>
+              <a:t>5/19/2021</a:t>
             </a:fld>
             <a:endParaRPr lang="en-US"/>
           </a:p>
@@ -470,7 +470,7 @@
           <p:cNvPr id="5" name="Footer Placeholder 4">
             <a:extLst>
               <a:ext uri="{FF2B5EF4-FFF2-40B4-BE49-F238E27FC236}">
-                <a16:creationId xmlns:a16="http://schemas.microsoft.com/office/drawing/2014/main" id="{6A64B8AC-1AAB-45B6-B674-BE7981DEB702}"/>
+                <a16:creationId xmlns:a16="http://schemas.microsoft.com/office/drawing/2014/main" xmlns="" id="{6A64B8AC-1AAB-45B6-B674-BE7981DEB702}"/>
               </a:ext>
             </a:extLst>
           </p:cNvPr>
@@ -495,7 +495,7 @@
           <p:cNvPr id="6" name="Slide Number Placeholder 5">
             <a:extLst>
               <a:ext uri="{FF2B5EF4-FFF2-40B4-BE49-F238E27FC236}">
-                <a16:creationId xmlns:a16="http://schemas.microsoft.com/office/drawing/2014/main" id="{93609C02-E562-4EA7-812F-3B819E5CF15D}"/>
+                <a16:creationId xmlns:a16="http://schemas.microsoft.com/office/drawing/2014/main" xmlns="" id="{93609C02-E562-4EA7-812F-3B819E5CF15D}"/>
               </a:ext>
             </a:extLst>
           </p:cNvPr>
@@ -554,7 +554,7 @@
           <p:cNvPr id="2" name="Vertical Title 1">
             <a:extLst>
               <a:ext uri="{FF2B5EF4-FFF2-40B4-BE49-F238E27FC236}">
-                <a16:creationId xmlns:a16="http://schemas.microsoft.com/office/drawing/2014/main" id="{48589BD6-2D25-4D92-BA22-3506ACACBFAE}"/>
+                <a16:creationId xmlns:a16="http://schemas.microsoft.com/office/drawing/2014/main" xmlns="" id="{48589BD6-2D25-4D92-BA22-3506ACACBFAE}"/>
               </a:ext>
             </a:extLst>
           </p:cNvPr>
@@ -587,7 +587,7 @@
           <p:cNvPr id="3" name="Vertical Text Placeholder 2">
             <a:extLst>
               <a:ext uri="{FF2B5EF4-FFF2-40B4-BE49-F238E27FC236}">
-                <a16:creationId xmlns:a16="http://schemas.microsoft.com/office/drawing/2014/main" id="{C8134220-3032-4A08-8374-4A88995C0CA7}"/>
+                <a16:creationId xmlns:a16="http://schemas.microsoft.com/office/drawing/2014/main" xmlns="" id="{C8134220-3032-4A08-8374-4A88995C0CA7}"/>
               </a:ext>
             </a:extLst>
           </p:cNvPr>
@@ -649,7 +649,7 @@
           <p:cNvPr id="4" name="Date Placeholder 3">
             <a:extLst>
               <a:ext uri="{FF2B5EF4-FFF2-40B4-BE49-F238E27FC236}">
-                <a16:creationId xmlns:a16="http://schemas.microsoft.com/office/drawing/2014/main" id="{A4D62496-560A-4921-88A1-A24F71E0FF9A}"/>
+                <a16:creationId xmlns:a16="http://schemas.microsoft.com/office/drawing/2014/main" xmlns="" id="{A4D62496-560A-4921-88A1-A24F71E0FF9A}"/>
               </a:ext>
             </a:extLst>
           </p:cNvPr>
@@ -667,7 +667,7 @@
           <a:p>
             <a:fld id="{BC6D784A-583B-48B5-A7BC-BB401D5EE48B}" type="datetimeFigureOut">
               <a:rPr lang="en-US" smtClean="0"/>
-              <a:t>3/10/2021</a:t>
+              <a:t>5/19/2021</a:t>
             </a:fld>
             <a:endParaRPr lang="en-US"/>
           </a:p>
@@ -678,7 +678,7 @@
           <p:cNvPr id="5" name="Footer Placeholder 4">
             <a:extLst>
               <a:ext uri="{FF2B5EF4-FFF2-40B4-BE49-F238E27FC236}">
-                <a16:creationId xmlns:a16="http://schemas.microsoft.com/office/drawing/2014/main" id="{C73E7D3C-4D69-4475-AC26-13F467CD110C}"/>
+                <a16:creationId xmlns:a16="http://schemas.microsoft.com/office/drawing/2014/main" xmlns="" id="{C73E7D3C-4D69-4475-AC26-13F467CD110C}"/>
               </a:ext>
             </a:extLst>
           </p:cNvPr>
@@ -703,7 +703,7 @@
           <p:cNvPr id="6" name="Slide Number Placeholder 5">
             <a:extLst>
               <a:ext uri="{FF2B5EF4-FFF2-40B4-BE49-F238E27FC236}">
-                <a16:creationId xmlns:a16="http://schemas.microsoft.com/office/drawing/2014/main" id="{2F1D8A74-1EAE-43CC-AF92-74058E58C031}"/>
+                <a16:creationId xmlns:a16="http://schemas.microsoft.com/office/drawing/2014/main" xmlns="" id="{2F1D8A74-1EAE-43CC-AF92-74058E58C031}"/>
               </a:ext>
             </a:extLst>
           </p:cNvPr>
@@ -762,7 +762,7 @@
           <p:cNvPr id="2" name="Title 1">
             <a:extLst>
               <a:ext uri="{FF2B5EF4-FFF2-40B4-BE49-F238E27FC236}">
-                <a16:creationId xmlns:a16="http://schemas.microsoft.com/office/drawing/2014/main" id="{541D8DBC-8264-4DA7-9F7C-CF0D90991C03}"/>
+                <a16:creationId xmlns:a16="http://schemas.microsoft.com/office/drawing/2014/main" xmlns="" id="{541D8DBC-8264-4DA7-9F7C-CF0D90991C03}"/>
               </a:ext>
             </a:extLst>
           </p:cNvPr>
@@ -790,7 +790,7 @@
           <p:cNvPr id="3" name="Content Placeholder 2">
             <a:extLst>
               <a:ext uri="{FF2B5EF4-FFF2-40B4-BE49-F238E27FC236}">
-                <a16:creationId xmlns:a16="http://schemas.microsoft.com/office/drawing/2014/main" id="{5E9A3103-70DA-4455-B132-6EE2A825BA6C}"/>
+                <a16:creationId xmlns:a16="http://schemas.microsoft.com/office/drawing/2014/main" xmlns="" id="{5E9A3103-70DA-4455-B132-6EE2A825BA6C}"/>
               </a:ext>
             </a:extLst>
           </p:cNvPr>
@@ -847,7 +847,7 @@
           <p:cNvPr id="4" name="Date Placeholder 3">
             <a:extLst>
               <a:ext uri="{FF2B5EF4-FFF2-40B4-BE49-F238E27FC236}">
-                <a16:creationId xmlns:a16="http://schemas.microsoft.com/office/drawing/2014/main" id="{662F66A8-B599-4FA7-8481-A423F5B2CD9F}"/>
+                <a16:creationId xmlns:a16="http://schemas.microsoft.com/office/drawing/2014/main" xmlns="" id="{662F66A8-B599-4FA7-8481-A423F5B2CD9F}"/>
               </a:ext>
             </a:extLst>
           </p:cNvPr>
@@ -865,7 +865,7 @@
           <a:p>
             <a:fld id="{BC6D784A-583B-48B5-A7BC-BB401D5EE48B}" type="datetimeFigureOut">
               <a:rPr lang="en-US" smtClean="0"/>
-              <a:t>3/10/2021</a:t>
+              <a:t>5/19/2021</a:t>
             </a:fld>
             <a:endParaRPr lang="en-US"/>
           </a:p>
@@ -876,7 +876,7 @@
           <p:cNvPr id="5" name="Footer Placeholder 4">
             <a:extLst>
               <a:ext uri="{FF2B5EF4-FFF2-40B4-BE49-F238E27FC236}">
-                <a16:creationId xmlns:a16="http://schemas.microsoft.com/office/drawing/2014/main" id="{44137BD0-5EB8-4E0E-9610-3CBDFFA38F62}"/>
+                <a16:creationId xmlns:a16="http://schemas.microsoft.com/office/drawing/2014/main" xmlns="" id="{44137BD0-5EB8-4E0E-9610-3CBDFFA38F62}"/>
               </a:ext>
             </a:extLst>
           </p:cNvPr>
@@ -901,7 +901,7 @@
           <p:cNvPr id="6" name="Slide Number Placeholder 5">
             <a:extLst>
               <a:ext uri="{FF2B5EF4-FFF2-40B4-BE49-F238E27FC236}">
-                <a16:creationId xmlns:a16="http://schemas.microsoft.com/office/drawing/2014/main" id="{84BE4DE9-C954-481A-B556-5D14FA46383D}"/>
+                <a16:creationId xmlns:a16="http://schemas.microsoft.com/office/drawing/2014/main" xmlns="" id="{84BE4DE9-C954-481A-B556-5D14FA46383D}"/>
               </a:ext>
             </a:extLst>
           </p:cNvPr>
@@ -960,7 +960,7 @@
           <p:cNvPr id="2" name="Title 1">
             <a:extLst>
               <a:ext uri="{FF2B5EF4-FFF2-40B4-BE49-F238E27FC236}">
-                <a16:creationId xmlns:a16="http://schemas.microsoft.com/office/drawing/2014/main" id="{25E11B1C-844A-4DDA-A332-8FE51A3B0148}"/>
+                <a16:creationId xmlns:a16="http://schemas.microsoft.com/office/drawing/2014/main" xmlns="" id="{25E11B1C-844A-4DDA-A332-8FE51A3B0148}"/>
               </a:ext>
             </a:extLst>
           </p:cNvPr>
@@ -997,7 +997,7 @@
           <p:cNvPr id="3" name="Text Placeholder 2">
             <a:extLst>
               <a:ext uri="{FF2B5EF4-FFF2-40B4-BE49-F238E27FC236}">
-                <a16:creationId xmlns:a16="http://schemas.microsoft.com/office/drawing/2014/main" id="{9C5E05A5-972E-47E0-8FF2-038873C6D18D}"/>
+                <a16:creationId xmlns:a16="http://schemas.microsoft.com/office/drawing/2014/main" xmlns="" id="{9C5E05A5-972E-47E0-8FF2-038873C6D18D}"/>
               </a:ext>
             </a:extLst>
           </p:cNvPr>
@@ -1122,7 +1122,7 @@
           <p:cNvPr id="4" name="Date Placeholder 3">
             <a:extLst>
               <a:ext uri="{FF2B5EF4-FFF2-40B4-BE49-F238E27FC236}">
-                <a16:creationId xmlns:a16="http://schemas.microsoft.com/office/drawing/2014/main" id="{9BCB5436-0407-43D4-87C0-529DB1B10CA6}"/>
+                <a16:creationId xmlns:a16="http://schemas.microsoft.com/office/drawing/2014/main" xmlns="" id="{9BCB5436-0407-43D4-87C0-529DB1B10CA6}"/>
               </a:ext>
             </a:extLst>
           </p:cNvPr>
@@ -1140,7 +1140,7 @@
           <a:p>
             <a:fld id="{BC6D784A-583B-48B5-A7BC-BB401D5EE48B}" type="datetimeFigureOut">
               <a:rPr lang="en-US" smtClean="0"/>
-              <a:t>3/10/2021</a:t>
+              <a:t>5/19/2021</a:t>
             </a:fld>
             <a:endParaRPr lang="en-US"/>
           </a:p>
@@ -1151,7 +1151,7 @@
           <p:cNvPr id="5" name="Footer Placeholder 4">
             <a:extLst>
               <a:ext uri="{FF2B5EF4-FFF2-40B4-BE49-F238E27FC236}">
-                <a16:creationId xmlns:a16="http://schemas.microsoft.com/office/drawing/2014/main" id="{3E4BC692-04A6-429D-AEB8-D0C542B77DDA}"/>
+                <a16:creationId xmlns:a16="http://schemas.microsoft.com/office/drawing/2014/main" xmlns="" id="{3E4BC692-04A6-429D-AEB8-D0C542B77DDA}"/>
               </a:ext>
             </a:extLst>
           </p:cNvPr>
@@ -1176,7 +1176,7 @@
           <p:cNvPr id="6" name="Slide Number Placeholder 5">
             <a:extLst>
               <a:ext uri="{FF2B5EF4-FFF2-40B4-BE49-F238E27FC236}">
-                <a16:creationId xmlns:a16="http://schemas.microsoft.com/office/drawing/2014/main" id="{C184D3CF-B260-45B4-B602-96C9335F898E}"/>
+                <a16:creationId xmlns:a16="http://schemas.microsoft.com/office/drawing/2014/main" xmlns="" id="{C184D3CF-B260-45B4-B602-96C9335F898E}"/>
               </a:ext>
             </a:extLst>
           </p:cNvPr>
@@ -1235,7 +1235,7 @@
           <p:cNvPr id="2" name="Title 1">
             <a:extLst>
               <a:ext uri="{FF2B5EF4-FFF2-40B4-BE49-F238E27FC236}">
-                <a16:creationId xmlns:a16="http://schemas.microsoft.com/office/drawing/2014/main" id="{AACB080F-2920-4B6B-886E-CD0B9D7476F0}"/>
+                <a16:creationId xmlns:a16="http://schemas.microsoft.com/office/drawing/2014/main" xmlns="" id="{AACB080F-2920-4B6B-886E-CD0B9D7476F0}"/>
               </a:ext>
             </a:extLst>
           </p:cNvPr>
@@ -1263,7 +1263,7 @@
           <p:cNvPr id="3" name="Content Placeholder 2">
             <a:extLst>
               <a:ext uri="{FF2B5EF4-FFF2-40B4-BE49-F238E27FC236}">
-                <a16:creationId xmlns:a16="http://schemas.microsoft.com/office/drawing/2014/main" id="{D323F7CF-BA34-46E0-84B1-A4668FF86E62}"/>
+                <a16:creationId xmlns:a16="http://schemas.microsoft.com/office/drawing/2014/main" xmlns="" id="{D323F7CF-BA34-46E0-84B1-A4668FF86E62}"/>
               </a:ext>
             </a:extLst>
           </p:cNvPr>
@@ -1325,7 +1325,7 @@
           <p:cNvPr id="4" name="Content Placeholder 3">
             <a:extLst>
               <a:ext uri="{FF2B5EF4-FFF2-40B4-BE49-F238E27FC236}">
-                <a16:creationId xmlns:a16="http://schemas.microsoft.com/office/drawing/2014/main" id="{200F6E44-0B5D-431E-9179-08926A600743}"/>
+                <a16:creationId xmlns:a16="http://schemas.microsoft.com/office/drawing/2014/main" xmlns="" id="{200F6E44-0B5D-431E-9179-08926A600743}"/>
               </a:ext>
             </a:extLst>
           </p:cNvPr>
@@ -1387,7 +1387,7 @@
           <p:cNvPr id="5" name="Date Placeholder 4">
             <a:extLst>
               <a:ext uri="{FF2B5EF4-FFF2-40B4-BE49-F238E27FC236}">
-                <a16:creationId xmlns:a16="http://schemas.microsoft.com/office/drawing/2014/main" id="{7AF1AA72-6430-4BB7-AED6-51CDA6B86D3E}"/>
+                <a16:creationId xmlns:a16="http://schemas.microsoft.com/office/drawing/2014/main" xmlns="" id="{7AF1AA72-6430-4BB7-AED6-51CDA6B86D3E}"/>
               </a:ext>
             </a:extLst>
           </p:cNvPr>
@@ -1405,7 +1405,7 @@
           <a:p>
             <a:fld id="{BC6D784A-583B-48B5-A7BC-BB401D5EE48B}" type="datetimeFigureOut">
               <a:rPr lang="en-US" smtClean="0"/>
-              <a:t>3/10/2021</a:t>
+              <a:t>5/19/2021</a:t>
             </a:fld>
             <a:endParaRPr lang="en-US"/>
           </a:p>
@@ -1416,7 +1416,7 @@
           <p:cNvPr id="6" name="Footer Placeholder 5">
             <a:extLst>
               <a:ext uri="{FF2B5EF4-FFF2-40B4-BE49-F238E27FC236}">
-                <a16:creationId xmlns:a16="http://schemas.microsoft.com/office/drawing/2014/main" id="{3D426689-5DEE-4200-B14A-0C9B451E9C2C}"/>
+                <a16:creationId xmlns:a16="http://schemas.microsoft.com/office/drawing/2014/main" xmlns="" id="{3D426689-5DEE-4200-B14A-0C9B451E9C2C}"/>
               </a:ext>
             </a:extLst>
           </p:cNvPr>
@@ -1441,7 +1441,7 @@
           <p:cNvPr id="7" name="Slide Number Placeholder 6">
             <a:extLst>
               <a:ext uri="{FF2B5EF4-FFF2-40B4-BE49-F238E27FC236}">
-                <a16:creationId xmlns:a16="http://schemas.microsoft.com/office/drawing/2014/main" id="{4729B331-D2B5-411D-8A0E-2F5A448419FF}"/>
+                <a16:creationId xmlns:a16="http://schemas.microsoft.com/office/drawing/2014/main" xmlns="" id="{4729B331-D2B5-411D-8A0E-2F5A448419FF}"/>
               </a:ext>
             </a:extLst>
           </p:cNvPr>
@@ -1500,7 +1500,7 @@
           <p:cNvPr id="2" name="Title 1">
             <a:extLst>
               <a:ext uri="{FF2B5EF4-FFF2-40B4-BE49-F238E27FC236}">
-                <a16:creationId xmlns:a16="http://schemas.microsoft.com/office/drawing/2014/main" id="{047D8B21-A203-4E40-8604-A18AA0AE4FC8}"/>
+                <a16:creationId xmlns:a16="http://schemas.microsoft.com/office/drawing/2014/main" xmlns="" id="{047D8B21-A203-4E40-8604-A18AA0AE4FC8}"/>
               </a:ext>
             </a:extLst>
           </p:cNvPr>
@@ -1533,7 +1533,7 @@
           <p:cNvPr id="3" name="Text Placeholder 2">
             <a:extLst>
               <a:ext uri="{FF2B5EF4-FFF2-40B4-BE49-F238E27FC236}">
-                <a16:creationId xmlns:a16="http://schemas.microsoft.com/office/drawing/2014/main" id="{043E43D7-A9CF-44A7-9D18-24DA93B47D05}"/>
+                <a16:creationId xmlns:a16="http://schemas.microsoft.com/office/drawing/2014/main" xmlns="" id="{043E43D7-A9CF-44A7-9D18-24DA93B47D05}"/>
               </a:ext>
             </a:extLst>
           </p:cNvPr>
@@ -1604,7 +1604,7 @@
           <p:cNvPr id="4" name="Content Placeholder 3">
             <a:extLst>
               <a:ext uri="{FF2B5EF4-FFF2-40B4-BE49-F238E27FC236}">
-                <a16:creationId xmlns:a16="http://schemas.microsoft.com/office/drawing/2014/main" id="{039954FD-D727-4FF7-B7C5-072E9083A077}"/>
+                <a16:creationId xmlns:a16="http://schemas.microsoft.com/office/drawing/2014/main" xmlns="" id="{039954FD-D727-4FF7-B7C5-072E9083A077}"/>
               </a:ext>
             </a:extLst>
           </p:cNvPr>
@@ -1666,7 +1666,7 @@
           <p:cNvPr id="5" name="Text Placeholder 4">
             <a:extLst>
               <a:ext uri="{FF2B5EF4-FFF2-40B4-BE49-F238E27FC236}">
-                <a16:creationId xmlns:a16="http://schemas.microsoft.com/office/drawing/2014/main" id="{A7A81E98-849F-4E55-9DA2-8952D036F1C6}"/>
+                <a16:creationId xmlns:a16="http://schemas.microsoft.com/office/drawing/2014/main" xmlns="" id="{A7A81E98-849F-4E55-9DA2-8952D036F1C6}"/>
               </a:ext>
             </a:extLst>
           </p:cNvPr>
@@ -1737,7 +1737,7 @@
           <p:cNvPr id="6" name="Content Placeholder 5">
             <a:extLst>
               <a:ext uri="{FF2B5EF4-FFF2-40B4-BE49-F238E27FC236}">
-                <a16:creationId xmlns:a16="http://schemas.microsoft.com/office/drawing/2014/main" id="{7C0F4AE8-242E-4051-8434-600B65897F92}"/>
+                <a16:creationId xmlns:a16="http://schemas.microsoft.com/office/drawing/2014/main" xmlns="" id="{7C0F4AE8-242E-4051-8434-600B65897F92}"/>
               </a:ext>
             </a:extLst>
           </p:cNvPr>
@@ -1799,7 +1799,7 @@
           <p:cNvPr id="7" name="Date Placeholder 6">
             <a:extLst>
               <a:ext uri="{FF2B5EF4-FFF2-40B4-BE49-F238E27FC236}">
-                <a16:creationId xmlns:a16="http://schemas.microsoft.com/office/drawing/2014/main" id="{2B806670-D35B-4C48-AB17-C376287DD171}"/>
+                <a16:creationId xmlns:a16="http://schemas.microsoft.com/office/drawing/2014/main" xmlns="" id="{2B806670-D35B-4C48-AB17-C376287DD171}"/>
               </a:ext>
             </a:extLst>
           </p:cNvPr>
@@ -1817,7 +1817,7 @@
           <a:p>
             <a:fld id="{BC6D784A-583B-48B5-A7BC-BB401D5EE48B}" type="datetimeFigureOut">
               <a:rPr lang="en-US" smtClean="0"/>
-              <a:t>3/10/2021</a:t>
+              <a:t>5/19/2021</a:t>
             </a:fld>
             <a:endParaRPr lang="en-US"/>
           </a:p>
@@ -1828,7 +1828,7 @@
           <p:cNvPr id="8" name="Footer Placeholder 7">
             <a:extLst>
               <a:ext uri="{FF2B5EF4-FFF2-40B4-BE49-F238E27FC236}">
-                <a16:creationId xmlns:a16="http://schemas.microsoft.com/office/drawing/2014/main" id="{F97FD541-4B04-4E58-9FC9-74E3056B8E43}"/>
+                <a16:creationId xmlns:a16="http://schemas.microsoft.com/office/drawing/2014/main" xmlns="" id="{F97FD541-4B04-4E58-9FC9-74E3056B8E43}"/>
               </a:ext>
             </a:extLst>
           </p:cNvPr>
@@ -1853,7 +1853,7 @@
           <p:cNvPr id="9" name="Slide Number Placeholder 8">
             <a:extLst>
               <a:ext uri="{FF2B5EF4-FFF2-40B4-BE49-F238E27FC236}">
-                <a16:creationId xmlns:a16="http://schemas.microsoft.com/office/drawing/2014/main" id="{C498B9BB-9BDE-4B18-A278-492FF5C317AC}"/>
+                <a16:creationId xmlns:a16="http://schemas.microsoft.com/office/drawing/2014/main" xmlns="" id="{C498B9BB-9BDE-4B18-A278-492FF5C317AC}"/>
               </a:ext>
             </a:extLst>
           </p:cNvPr>
@@ -1912,7 +1912,7 @@
           <p:cNvPr id="2" name="Title 1">
             <a:extLst>
               <a:ext uri="{FF2B5EF4-FFF2-40B4-BE49-F238E27FC236}">
-                <a16:creationId xmlns:a16="http://schemas.microsoft.com/office/drawing/2014/main" id="{2E25CEDD-7130-4133-A166-9B17B4ABA1AF}"/>
+                <a16:creationId xmlns:a16="http://schemas.microsoft.com/office/drawing/2014/main" xmlns="" id="{2E25CEDD-7130-4133-A166-9B17B4ABA1AF}"/>
               </a:ext>
             </a:extLst>
           </p:cNvPr>
@@ -1940,7 +1940,7 @@
           <p:cNvPr id="3" name="Date Placeholder 2">
             <a:extLst>
               <a:ext uri="{FF2B5EF4-FFF2-40B4-BE49-F238E27FC236}">
-                <a16:creationId xmlns:a16="http://schemas.microsoft.com/office/drawing/2014/main" id="{41BB8B44-A51A-49E0-A163-9506E257F1D5}"/>
+                <a16:creationId xmlns:a16="http://schemas.microsoft.com/office/drawing/2014/main" xmlns="" id="{41BB8B44-A51A-49E0-A163-9506E257F1D5}"/>
               </a:ext>
             </a:extLst>
           </p:cNvPr>
@@ -1958,7 +1958,7 @@
           <a:p>
             <a:fld id="{BC6D784A-583B-48B5-A7BC-BB401D5EE48B}" type="datetimeFigureOut">
               <a:rPr lang="en-US" smtClean="0"/>
-              <a:t>3/10/2021</a:t>
+              <a:t>5/19/2021</a:t>
             </a:fld>
             <a:endParaRPr lang="en-US"/>
           </a:p>
@@ -1969,7 +1969,7 @@
           <p:cNvPr id="4" name="Footer Placeholder 3">
             <a:extLst>
               <a:ext uri="{FF2B5EF4-FFF2-40B4-BE49-F238E27FC236}">
-                <a16:creationId xmlns:a16="http://schemas.microsoft.com/office/drawing/2014/main" id="{3AA86DBA-4C62-4CDA-8D86-DAAF0998B536}"/>
+                <a16:creationId xmlns:a16="http://schemas.microsoft.com/office/drawing/2014/main" xmlns="" id="{3AA86DBA-4C62-4CDA-8D86-DAAF0998B536}"/>
               </a:ext>
             </a:extLst>
           </p:cNvPr>
@@ -1994,7 +1994,7 @@
           <p:cNvPr id="5" name="Slide Number Placeholder 4">
             <a:extLst>
               <a:ext uri="{FF2B5EF4-FFF2-40B4-BE49-F238E27FC236}">
-                <a16:creationId xmlns:a16="http://schemas.microsoft.com/office/drawing/2014/main" id="{B3FC3790-0466-4A1F-84FD-794756FE3435}"/>
+                <a16:creationId xmlns:a16="http://schemas.microsoft.com/office/drawing/2014/main" xmlns="" id="{B3FC3790-0466-4A1F-84FD-794756FE3435}"/>
               </a:ext>
             </a:extLst>
           </p:cNvPr>
@@ -2053,7 +2053,7 @@
           <p:cNvPr id="2" name="Date Placeholder 1">
             <a:extLst>
               <a:ext uri="{FF2B5EF4-FFF2-40B4-BE49-F238E27FC236}">
-                <a16:creationId xmlns:a16="http://schemas.microsoft.com/office/drawing/2014/main" id="{575793CB-4ACB-4E24-8048-2D133954201F}"/>
+                <a16:creationId xmlns:a16="http://schemas.microsoft.com/office/drawing/2014/main" xmlns="" id="{575793CB-4ACB-4E24-8048-2D133954201F}"/>
               </a:ext>
             </a:extLst>
           </p:cNvPr>
@@ -2071,7 +2071,7 @@
           <a:p>
             <a:fld id="{BC6D784A-583B-48B5-A7BC-BB401D5EE48B}" type="datetimeFigureOut">
               <a:rPr lang="en-US" smtClean="0"/>
-              <a:t>3/10/2021</a:t>
+              <a:t>5/19/2021</a:t>
             </a:fld>
             <a:endParaRPr lang="en-US"/>
           </a:p>
@@ -2082,7 +2082,7 @@
           <p:cNvPr id="3" name="Footer Placeholder 2">
             <a:extLst>
               <a:ext uri="{FF2B5EF4-FFF2-40B4-BE49-F238E27FC236}">
-                <a16:creationId xmlns:a16="http://schemas.microsoft.com/office/drawing/2014/main" id="{84A64659-85A8-453D-ADFA-FE48CF3A1884}"/>
+                <a16:creationId xmlns:a16="http://schemas.microsoft.com/office/drawing/2014/main" xmlns="" id="{84A64659-85A8-453D-ADFA-FE48CF3A1884}"/>
               </a:ext>
             </a:extLst>
           </p:cNvPr>
@@ -2107,7 +2107,7 @@
           <p:cNvPr id="4" name="Slide Number Placeholder 3">
             <a:extLst>
               <a:ext uri="{FF2B5EF4-FFF2-40B4-BE49-F238E27FC236}">
-                <a16:creationId xmlns:a16="http://schemas.microsoft.com/office/drawing/2014/main" id="{E3CB3061-C0CF-4C37-9C78-614BBF049282}"/>
+                <a16:creationId xmlns:a16="http://schemas.microsoft.com/office/drawing/2014/main" xmlns="" id="{E3CB3061-C0CF-4C37-9C78-614BBF049282}"/>
               </a:ext>
             </a:extLst>
           </p:cNvPr>
@@ -2166,7 +2166,7 @@
           <p:cNvPr id="2" name="Title 1">
             <a:extLst>
               <a:ext uri="{FF2B5EF4-FFF2-40B4-BE49-F238E27FC236}">
-                <a16:creationId xmlns:a16="http://schemas.microsoft.com/office/drawing/2014/main" id="{53B09293-860B-44E2-AA43-F7DFBE6CFB3B}"/>
+                <a16:creationId xmlns:a16="http://schemas.microsoft.com/office/drawing/2014/main" xmlns="" id="{53B09293-860B-44E2-AA43-F7DFBE6CFB3B}"/>
               </a:ext>
             </a:extLst>
           </p:cNvPr>
@@ -2203,7 +2203,7 @@
           <p:cNvPr id="3" name="Content Placeholder 2">
             <a:extLst>
               <a:ext uri="{FF2B5EF4-FFF2-40B4-BE49-F238E27FC236}">
-                <a16:creationId xmlns:a16="http://schemas.microsoft.com/office/drawing/2014/main" id="{52AB542B-9AE5-4F39-ACCC-7F9635F15CA7}"/>
+                <a16:creationId xmlns:a16="http://schemas.microsoft.com/office/drawing/2014/main" xmlns="" id="{52AB542B-9AE5-4F39-ACCC-7F9635F15CA7}"/>
               </a:ext>
             </a:extLst>
           </p:cNvPr>
@@ -2293,7 +2293,7 @@
           <p:cNvPr id="4" name="Text Placeholder 3">
             <a:extLst>
               <a:ext uri="{FF2B5EF4-FFF2-40B4-BE49-F238E27FC236}">
-                <a16:creationId xmlns:a16="http://schemas.microsoft.com/office/drawing/2014/main" id="{1661651C-A094-4132-A7C2-E51789223941}"/>
+                <a16:creationId xmlns:a16="http://schemas.microsoft.com/office/drawing/2014/main" xmlns="" id="{1661651C-A094-4132-A7C2-E51789223941}"/>
               </a:ext>
             </a:extLst>
           </p:cNvPr>
@@ -2364,7 +2364,7 @@
           <p:cNvPr id="5" name="Date Placeholder 4">
             <a:extLst>
               <a:ext uri="{FF2B5EF4-FFF2-40B4-BE49-F238E27FC236}">
-                <a16:creationId xmlns:a16="http://schemas.microsoft.com/office/drawing/2014/main" id="{ACFE2789-D121-4FAB-A58A-33C249124652}"/>
+                <a16:creationId xmlns:a16="http://schemas.microsoft.com/office/drawing/2014/main" xmlns="" id="{ACFE2789-D121-4FAB-A58A-33C249124652}"/>
               </a:ext>
             </a:extLst>
           </p:cNvPr>
@@ -2382,7 +2382,7 @@
           <a:p>
             <a:fld id="{BC6D784A-583B-48B5-A7BC-BB401D5EE48B}" type="datetimeFigureOut">
               <a:rPr lang="en-US" smtClean="0"/>
-              <a:t>3/10/2021</a:t>
+              <a:t>5/19/2021</a:t>
             </a:fld>
             <a:endParaRPr lang="en-US"/>
           </a:p>
@@ -2393,7 +2393,7 @@
           <p:cNvPr id="6" name="Footer Placeholder 5">
             <a:extLst>
               <a:ext uri="{FF2B5EF4-FFF2-40B4-BE49-F238E27FC236}">
-                <a16:creationId xmlns:a16="http://schemas.microsoft.com/office/drawing/2014/main" id="{F7E49FB4-7DB9-43F2-93D4-B39434B2B3A1}"/>
+                <a16:creationId xmlns:a16="http://schemas.microsoft.com/office/drawing/2014/main" xmlns="" id="{F7E49FB4-7DB9-43F2-93D4-B39434B2B3A1}"/>
               </a:ext>
             </a:extLst>
           </p:cNvPr>
@@ -2418,7 +2418,7 @@
           <p:cNvPr id="7" name="Slide Number Placeholder 6">
             <a:extLst>
               <a:ext uri="{FF2B5EF4-FFF2-40B4-BE49-F238E27FC236}">
-                <a16:creationId xmlns:a16="http://schemas.microsoft.com/office/drawing/2014/main" id="{8CE58199-3298-46EF-9EAB-434D4CE84F59}"/>
+                <a16:creationId xmlns:a16="http://schemas.microsoft.com/office/drawing/2014/main" xmlns="" id="{8CE58199-3298-46EF-9EAB-434D4CE84F59}"/>
               </a:ext>
             </a:extLst>
           </p:cNvPr>
@@ -2477,7 +2477,7 @@
           <p:cNvPr id="2" name="Title 1">
             <a:extLst>
               <a:ext uri="{FF2B5EF4-FFF2-40B4-BE49-F238E27FC236}">
-                <a16:creationId xmlns:a16="http://schemas.microsoft.com/office/drawing/2014/main" id="{E64FBD28-E010-4D89-9653-A1FF9C2341C4}"/>
+                <a16:creationId xmlns:a16="http://schemas.microsoft.com/office/drawing/2014/main" xmlns="" id="{E64FBD28-E010-4D89-9653-A1FF9C2341C4}"/>
               </a:ext>
             </a:extLst>
           </p:cNvPr>
@@ -2514,7 +2514,7 @@
           <p:cNvPr id="3" name="Picture Placeholder 2">
             <a:extLst>
               <a:ext uri="{FF2B5EF4-FFF2-40B4-BE49-F238E27FC236}">
-                <a16:creationId xmlns:a16="http://schemas.microsoft.com/office/drawing/2014/main" id="{DB077C8F-D8DB-4A6F-9161-5447EB83DE78}"/>
+                <a16:creationId xmlns:a16="http://schemas.microsoft.com/office/drawing/2014/main" xmlns="" id="{DB077C8F-D8DB-4A6F-9161-5447EB83DE78}"/>
               </a:ext>
             </a:extLst>
           </p:cNvPr>
@@ -2581,7 +2581,7 @@
           <p:cNvPr id="4" name="Text Placeholder 3">
             <a:extLst>
               <a:ext uri="{FF2B5EF4-FFF2-40B4-BE49-F238E27FC236}">
-                <a16:creationId xmlns:a16="http://schemas.microsoft.com/office/drawing/2014/main" id="{B9EC0159-FAFC-442E-91AB-2E17CE83E27D}"/>
+                <a16:creationId xmlns:a16="http://schemas.microsoft.com/office/drawing/2014/main" xmlns="" id="{B9EC0159-FAFC-442E-91AB-2E17CE83E27D}"/>
               </a:ext>
             </a:extLst>
           </p:cNvPr>
@@ -2652,7 +2652,7 @@
           <p:cNvPr id="5" name="Date Placeholder 4">
             <a:extLst>
               <a:ext uri="{FF2B5EF4-FFF2-40B4-BE49-F238E27FC236}">
-                <a16:creationId xmlns:a16="http://schemas.microsoft.com/office/drawing/2014/main" id="{7504BB19-C980-4220-A675-B0AB57CED728}"/>
+                <a16:creationId xmlns:a16="http://schemas.microsoft.com/office/drawing/2014/main" xmlns="" id="{7504BB19-C980-4220-A675-B0AB57CED728}"/>
               </a:ext>
             </a:extLst>
           </p:cNvPr>
@@ -2670,7 +2670,7 @@
           <a:p>
             <a:fld id="{BC6D784A-583B-48B5-A7BC-BB401D5EE48B}" type="datetimeFigureOut">
               <a:rPr lang="en-US" smtClean="0"/>
-              <a:t>3/10/2021</a:t>
+              <a:t>5/19/2021</a:t>
             </a:fld>
             <a:endParaRPr lang="en-US"/>
           </a:p>
@@ -2681,7 +2681,7 @@
           <p:cNvPr id="6" name="Footer Placeholder 5">
             <a:extLst>
               <a:ext uri="{FF2B5EF4-FFF2-40B4-BE49-F238E27FC236}">
-                <a16:creationId xmlns:a16="http://schemas.microsoft.com/office/drawing/2014/main" id="{0F7B7B52-9AF1-43D6-B31E-12CAC927B401}"/>
+                <a16:creationId xmlns:a16="http://schemas.microsoft.com/office/drawing/2014/main" xmlns="" id="{0F7B7B52-9AF1-43D6-B31E-12CAC927B401}"/>
               </a:ext>
             </a:extLst>
           </p:cNvPr>
@@ -2706,7 +2706,7 @@
           <p:cNvPr id="7" name="Slide Number Placeholder 6">
             <a:extLst>
               <a:ext uri="{FF2B5EF4-FFF2-40B4-BE49-F238E27FC236}">
-                <a16:creationId xmlns:a16="http://schemas.microsoft.com/office/drawing/2014/main" id="{C3D19F7E-2866-4D97-A148-F499274F7FE1}"/>
+                <a16:creationId xmlns:a16="http://schemas.microsoft.com/office/drawing/2014/main" xmlns="" id="{C3D19F7E-2866-4D97-A148-F499274F7FE1}"/>
               </a:ext>
             </a:extLst>
           </p:cNvPr>
@@ -2770,7 +2770,7 @@
           <p:cNvPr id="2" name="Title Placeholder 1">
             <a:extLst>
               <a:ext uri="{FF2B5EF4-FFF2-40B4-BE49-F238E27FC236}">
-                <a16:creationId xmlns:a16="http://schemas.microsoft.com/office/drawing/2014/main" id="{90E7D6B5-06A4-4EBB-B975-A85B54031755}"/>
+                <a16:creationId xmlns:a16="http://schemas.microsoft.com/office/drawing/2014/main" xmlns="" id="{90E7D6B5-06A4-4EBB-B975-A85B54031755}"/>
               </a:ext>
             </a:extLst>
           </p:cNvPr>
@@ -2808,7 +2808,7 @@
           <p:cNvPr id="3" name="Text Placeholder 2">
             <a:extLst>
               <a:ext uri="{FF2B5EF4-FFF2-40B4-BE49-F238E27FC236}">
-                <a16:creationId xmlns:a16="http://schemas.microsoft.com/office/drawing/2014/main" id="{FF0C0480-9C7B-4970-8DB2-5F1A06577E64}"/>
+                <a16:creationId xmlns:a16="http://schemas.microsoft.com/office/drawing/2014/main" xmlns="" id="{FF0C0480-9C7B-4970-8DB2-5F1A06577E64}"/>
               </a:ext>
             </a:extLst>
           </p:cNvPr>
@@ -2875,7 +2875,7 @@
           <p:cNvPr id="4" name="Date Placeholder 3">
             <a:extLst>
               <a:ext uri="{FF2B5EF4-FFF2-40B4-BE49-F238E27FC236}">
-                <a16:creationId xmlns:a16="http://schemas.microsoft.com/office/drawing/2014/main" id="{1670FC7A-8A22-4E26-89C0-D4E22EA5111A}"/>
+                <a16:creationId xmlns:a16="http://schemas.microsoft.com/office/drawing/2014/main" xmlns="" id="{1670FC7A-8A22-4E26-89C0-D4E22EA5111A}"/>
               </a:ext>
             </a:extLst>
           </p:cNvPr>
@@ -2911,7 +2911,7 @@
           <a:p>
             <a:fld id="{BC6D784A-583B-48B5-A7BC-BB401D5EE48B}" type="datetimeFigureOut">
               <a:rPr lang="en-US" smtClean="0"/>
-              <a:t>3/10/2021</a:t>
+              <a:t>5/19/2021</a:t>
             </a:fld>
             <a:endParaRPr lang="en-US"/>
           </a:p>
@@ -2922,7 +2922,7 @@
           <p:cNvPr id="5" name="Footer Placeholder 4">
             <a:extLst>
               <a:ext uri="{FF2B5EF4-FFF2-40B4-BE49-F238E27FC236}">
-                <a16:creationId xmlns:a16="http://schemas.microsoft.com/office/drawing/2014/main" id="{B101AD4B-FB2B-463C-9422-7AC8AE58D0D9}"/>
+                <a16:creationId xmlns:a16="http://schemas.microsoft.com/office/drawing/2014/main" xmlns="" id="{B101AD4B-FB2B-463C-9422-7AC8AE58D0D9}"/>
               </a:ext>
             </a:extLst>
           </p:cNvPr>
@@ -2965,7 +2965,7 @@
           <p:cNvPr id="6" name="Slide Number Placeholder 5">
             <a:extLst>
               <a:ext uri="{FF2B5EF4-FFF2-40B4-BE49-F238E27FC236}">
-                <a16:creationId xmlns:a16="http://schemas.microsoft.com/office/drawing/2014/main" id="{72CD587B-2476-4532-BC17-8C8D04C26345}"/>
+                <a16:creationId xmlns:a16="http://schemas.microsoft.com/office/drawing/2014/main" xmlns="" id="{72CD587B-2476-4532-BC17-8C8D04C26345}"/>
               </a:ext>
             </a:extLst>
           </p:cNvPr>
@@ -3333,7 +3333,7 @@
           <p:cNvPr id="2" name="Title 1">
             <a:extLst>
               <a:ext uri="{FF2B5EF4-FFF2-40B4-BE49-F238E27FC236}">
-                <a16:creationId xmlns:a16="http://schemas.microsoft.com/office/drawing/2014/main" id="{EC68DA72-B553-46D9-BEE7-25639C98ED4A}"/>
+                <a16:creationId xmlns:a16="http://schemas.microsoft.com/office/drawing/2014/main" xmlns="" id="{EC68DA72-B553-46D9-BEE7-25639C98ED4A}"/>
               </a:ext>
             </a:extLst>
           </p:cNvPr>
@@ -3352,7 +3352,7 @@
         </p:spPr>
         <p:txBody>
           <a:bodyPr>
-            <a:normAutofit/>
+            <a:normAutofit fontScale="90000"/>
           </a:bodyPr>
           <a:lstStyle/>
           <a:p>
@@ -3450,7 +3450,27 @@
                 <a:effectLst/>
                 <a:latin typeface="montserrat"/>
               </a:rPr>
-              <a:t>orecast in Short-Term and Raise an Alarm on Cyanotoxins and Harmful Algal Blooms(</a:t>
+              <a:t>orecast in Short-Term and Raise an Alarm on </a:t>
+            </a:r>
+            <a:r>
+              <a:rPr lang="en-US" sz="3200" b="1" i="0" dirty="0" smtClean="0">
+                <a:solidFill>
+                  <a:srgbClr val="333333"/>
+                </a:solidFill>
+                <a:effectLst/>
+                <a:latin typeface="montserrat"/>
+              </a:rPr>
+              <a:t>Cyanotoxins </a:t>
+            </a:r>
+            <a:r>
+              <a:rPr lang="en-US" sz="3200" b="1" i="0" dirty="0">
+                <a:solidFill>
+                  <a:srgbClr val="333333"/>
+                </a:solidFill>
+                <a:effectLst/>
+                <a:latin typeface="montserrat"/>
+              </a:rPr>
+              <a:t>and Harmful Algal Blooms(</a:t>
             </a:r>
             <a:r>
               <a:rPr lang="en-US" sz="3200" b="1" i="0" dirty="0" err="1">
@@ -3480,7 +3500,7 @@
           <p:cNvPr id="8" name="Picture 7">
             <a:extLst>
               <a:ext uri="{FF2B5EF4-FFF2-40B4-BE49-F238E27FC236}">
-                <a16:creationId xmlns:a16="http://schemas.microsoft.com/office/drawing/2014/main" id="{544E8478-687E-4341-A132-233796D98B71}"/>
+                <a16:creationId xmlns:a16="http://schemas.microsoft.com/office/drawing/2014/main" xmlns="" id="{544E8478-687E-4341-A132-233796D98B71}"/>
               </a:ext>
             </a:extLst>
           </p:cNvPr>
@@ -3490,7 +3510,7 @@
           <p:nvPr/>
         </p:nvPicPr>
         <p:blipFill>
-          <a:blip r:embed="rId2">
+          <a:blip r:embed="rId2" cstate="print">
             <a:extLst>
               <a:ext uri="{28A0092B-C50C-407E-A947-70E740481C1C}">
                 <a14:useLocalDpi xmlns:a14="http://schemas.microsoft.com/office/drawing/2010/main" val="0"/>
@@ -3516,7 +3536,7 @@
           <p:cNvPr id="9" name="Picture 8">
             <a:extLst>
               <a:ext uri="{FF2B5EF4-FFF2-40B4-BE49-F238E27FC236}">
-                <a16:creationId xmlns:a16="http://schemas.microsoft.com/office/drawing/2014/main" id="{D2931C58-0BCB-48F1-BC1F-D83C16741BFD}"/>
+                <a16:creationId xmlns:a16="http://schemas.microsoft.com/office/drawing/2014/main" xmlns="" id="{D2931C58-0BCB-48F1-BC1F-D83C16741BFD}"/>
               </a:ext>
             </a:extLst>
           </p:cNvPr>
@@ -3526,7 +3546,7 @@
           <p:nvPr/>
         </p:nvPicPr>
         <p:blipFill>
-          <a:blip r:embed="rId3">
+          <a:blip r:embed="rId3" cstate="print">
             <a:extLst>
               <a:ext uri="{28A0092B-C50C-407E-A947-70E740481C1C}">
                 <a14:useLocalDpi xmlns:a14="http://schemas.microsoft.com/office/drawing/2010/main" val="0"/>
@@ -3552,7 +3572,7 @@
           <p:cNvPr id="10" name="Picture 9">
             <a:extLst>
               <a:ext uri="{FF2B5EF4-FFF2-40B4-BE49-F238E27FC236}">
-                <a16:creationId xmlns:a16="http://schemas.microsoft.com/office/drawing/2014/main" id="{E86508A7-3C58-4286-9C52-9C6B8A3928D8}"/>
+                <a16:creationId xmlns:a16="http://schemas.microsoft.com/office/drawing/2014/main" xmlns="" id="{E86508A7-3C58-4286-9C52-9C6B8A3928D8}"/>
               </a:ext>
             </a:extLst>
           </p:cNvPr>
@@ -3562,7 +3582,7 @@
           <p:nvPr/>
         </p:nvPicPr>
         <p:blipFill>
-          <a:blip r:embed="rId4">
+          <a:blip r:embed="rId4" cstate="print">
             <a:extLst>
               <a:ext uri="{28A0092B-C50C-407E-A947-70E740481C1C}">
                 <a14:useLocalDpi xmlns:a14="http://schemas.microsoft.com/office/drawing/2010/main" val="0"/>
@@ -3588,7 +3608,7 @@
           <p:cNvPr id="11" name="Picture 10">
             <a:extLst>
               <a:ext uri="{FF2B5EF4-FFF2-40B4-BE49-F238E27FC236}">
-                <a16:creationId xmlns:a16="http://schemas.microsoft.com/office/drawing/2014/main" id="{D4E137CC-6BDC-4F1A-A015-5A3CEB442AA0}"/>
+                <a16:creationId xmlns:a16="http://schemas.microsoft.com/office/drawing/2014/main" xmlns="" id="{D4E137CC-6BDC-4F1A-A015-5A3CEB442AA0}"/>
               </a:ext>
             </a:extLst>
           </p:cNvPr>
@@ -3598,7 +3618,7 @@
           <p:nvPr/>
         </p:nvPicPr>
         <p:blipFill>
-          <a:blip r:embed="rId5">
+          <a:blip r:embed="rId5" cstate="print">
             <a:extLst>
               <a:ext uri="{28A0092B-C50C-407E-A947-70E740481C1C}">
                 <a14:useLocalDpi xmlns:a14="http://schemas.microsoft.com/office/drawing/2010/main" val="0"/>
@@ -3624,7 +3644,7 @@
           <p:cNvPr id="12" name="Picture 11">
             <a:extLst>
               <a:ext uri="{FF2B5EF4-FFF2-40B4-BE49-F238E27FC236}">
-                <a16:creationId xmlns:a16="http://schemas.microsoft.com/office/drawing/2014/main" id="{BDFDE0C1-6BCE-41F7-AAC3-82A2A2F367ED}"/>
+                <a16:creationId xmlns:a16="http://schemas.microsoft.com/office/drawing/2014/main" xmlns="" id="{BDFDE0C1-6BCE-41F7-AAC3-82A2A2F367ED}"/>
               </a:ext>
             </a:extLst>
           </p:cNvPr>
@@ -3634,7 +3654,7 @@
           <p:nvPr/>
         </p:nvPicPr>
         <p:blipFill>
-          <a:blip r:embed="rId6">
+          <a:blip r:embed="rId6" cstate="print">
             <a:extLst>
               <a:ext uri="{28A0092B-C50C-407E-A947-70E740481C1C}">
                 <a14:useLocalDpi xmlns:a14="http://schemas.microsoft.com/office/drawing/2010/main" val="0"/>
@@ -3690,7 +3710,7 @@
           <p:cNvPr id="2" name="Title 1">
             <a:extLst>
               <a:ext uri="{FF2B5EF4-FFF2-40B4-BE49-F238E27FC236}">
-                <a16:creationId xmlns:a16="http://schemas.microsoft.com/office/drawing/2014/main" id="{BEAC615C-7F17-4B36-AAAD-717E37184168}"/>
+                <a16:creationId xmlns:a16="http://schemas.microsoft.com/office/drawing/2014/main" xmlns="" id="{BEAC615C-7F17-4B36-AAAD-717E37184168}"/>
               </a:ext>
             </a:extLst>
           </p:cNvPr>
@@ -3724,7 +3744,7 @@
           <p:cNvPr id="3" name="Content Placeholder 2">
             <a:extLst>
               <a:ext uri="{FF2B5EF4-FFF2-40B4-BE49-F238E27FC236}">
-                <a16:creationId xmlns:a16="http://schemas.microsoft.com/office/drawing/2014/main" id="{93607C6C-9624-4FEF-8673-BA57961139F2}"/>
+                <a16:creationId xmlns:a16="http://schemas.microsoft.com/office/drawing/2014/main" xmlns="" id="{93607C6C-9624-4FEF-8673-BA57961139F2}"/>
               </a:ext>
             </a:extLst>
           </p:cNvPr>
@@ -3906,7 +3926,7 @@
           <p:cNvPr id="14" name="Picture 13">
             <a:extLst>
               <a:ext uri="{FF2B5EF4-FFF2-40B4-BE49-F238E27FC236}">
-                <a16:creationId xmlns:a16="http://schemas.microsoft.com/office/drawing/2014/main" id="{D43EBAAA-A01B-46E3-A035-4A59A3CEF6C0}"/>
+                <a16:creationId xmlns:a16="http://schemas.microsoft.com/office/drawing/2014/main" xmlns="" id="{D43EBAAA-A01B-46E3-A035-4A59A3CEF6C0}"/>
               </a:ext>
             </a:extLst>
           </p:cNvPr>
@@ -3942,7 +3962,7 @@
           <p:cNvPr id="15" name="Picture 14">
             <a:extLst>
               <a:ext uri="{FF2B5EF4-FFF2-40B4-BE49-F238E27FC236}">
-                <a16:creationId xmlns:a16="http://schemas.microsoft.com/office/drawing/2014/main" id="{67ED0CE7-CFB5-4B95-B855-91566D85A71C}"/>
+                <a16:creationId xmlns:a16="http://schemas.microsoft.com/office/drawing/2014/main" xmlns="" id="{67ED0CE7-CFB5-4B95-B855-91566D85A71C}"/>
               </a:ext>
             </a:extLst>
           </p:cNvPr>
@@ -3978,7 +3998,7 @@
           <p:cNvPr id="16" name="Picture 15">
             <a:extLst>
               <a:ext uri="{FF2B5EF4-FFF2-40B4-BE49-F238E27FC236}">
-                <a16:creationId xmlns:a16="http://schemas.microsoft.com/office/drawing/2014/main" id="{024B6143-A0F2-42A1-9034-E435BF489F7F}"/>
+                <a16:creationId xmlns:a16="http://schemas.microsoft.com/office/drawing/2014/main" xmlns="" id="{024B6143-A0F2-42A1-9034-E435BF489F7F}"/>
               </a:ext>
             </a:extLst>
           </p:cNvPr>
@@ -4014,7 +4034,7 @@
           <p:cNvPr id="17" name="Picture 16">
             <a:extLst>
               <a:ext uri="{FF2B5EF4-FFF2-40B4-BE49-F238E27FC236}">
-                <a16:creationId xmlns:a16="http://schemas.microsoft.com/office/drawing/2014/main" id="{A52D8DB9-F9E2-41B7-AD44-31937F3EBE84}"/>
+                <a16:creationId xmlns:a16="http://schemas.microsoft.com/office/drawing/2014/main" xmlns="" id="{A52D8DB9-F9E2-41B7-AD44-31937F3EBE84}"/>
               </a:ext>
             </a:extLst>
           </p:cNvPr>
@@ -4050,7 +4070,7 @@
           <p:cNvPr id="18" name="Picture 17">
             <a:extLst>
               <a:ext uri="{FF2B5EF4-FFF2-40B4-BE49-F238E27FC236}">
-                <a16:creationId xmlns:a16="http://schemas.microsoft.com/office/drawing/2014/main" id="{EC46E55B-5635-4C3B-8DAC-0058D6198A90}"/>
+                <a16:creationId xmlns:a16="http://schemas.microsoft.com/office/drawing/2014/main" xmlns="" id="{EC46E55B-5635-4C3B-8DAC-0058D6198A90}"/>
               </a:ext>
             </a:extLst>
           </p:cNvPr>
@@ -4073,7 +4093,7 @@
         </p:blipFill>
         <p:spPr>
           <a:xfrm>
-            <a:off x="221831" y="5273799"/>
+            <a:off x="221831" y="5181474"/>
             <a:ext cx="2027075" cy="1263353"/>
           </a:xfrm>
           <a:prstGeom prst="rect">
@@ -4086,7 +4106,7 @@
           <p:cNvPr id="27" name="Picture 26">
             <a:extLst>
               <a:ext uri="{FF2B5EF4-FFF2-40B4-BE49-F238E27FC236}">
-                <a16:creationId xmlns:a16="http://schemas.microsoft.com/office/drawing/2014/main" id="{4B6EEACF-29F4-4464-88B0-2255380A7575}"/>
+                <a16:creationId xmlns:a16="http://schemas.microsoft.com/office/drawing/2014/main" xmlns="" id="{4B6EEACF-29F4-4464-88B0-2255380A7575}"/>
               </a:ext>
             </a:extLst>
           </p:cNvPr>
@@ -4122,7 +4142,7 @@
           <p:cNvPr id="29" name="Straight Arrow Connector 28">
             <a:extLst>
               <a:ext uri="{FF2B5EF4-FFF2-40B4-BE49-F238E27FC236}">
-                <a16:creationId xmlns:a16="http://schemas.microsoft.com/office/drawing/2014/main" id="{46D3B211-D1BD-4BBE-908A-BA616FAC22FA}"/>
+                <a16:creationId xmlns:a16="http://schemas.microsoft.com/office/drawing/2014/main" xmlns="" id="{46D3B211-D1BD-4BBE-908A-BA616FAC22FA}"/>
               </a:ext>
             </a:extLst>
           </p:cNvPr>
@@ -4163,7 +4183,7 @@
           <p:cNvPr id="34" name="Straight Arrow Connector 33">
             <a:extLst>
               <a:ext uri="{FF2B5EF4-FFF2-40B4-BE49-F238E27FC236}">
-                <a16:creationId xmlns:a16="http://schemas.microsoft.com/office/drawing/2014/main" id="{E07A8D0D-C8CE-4B61-8E10-7A0A059DAF74}"/>
+                <a16:creationId xmlns:a16="http://schemas.microsoft.com/office/drawing/2014/main" xmlns="" id="{E07A8D0D-C8CE-4B61-8E10-7A0A059DAF74}"/>
               </a:ext>
             </a:extLst>
           </p:cNvPr>
@@ -4204,7 +4224,7 @@
           <p:cNvPr id="35" name="Straight Arrow Connector 34">
             <a:extLst>
               <a:ext uri="{FF2B5EF4-FFF2-40B4-BE49-F238E27FC236}">
-                <a16:creationId xmlns:a16="http://schemas.microsoft.com/office/drawing/2014/main" id="{4DB56BB6-828B-442A-A0AC-91F714E55EE4}"/>
+                <a16:creationId xmlns:a16="http://schemas.microsoft.com/office/drawing/2014/main" xmlns="" id="{4DB56BB6-828B-442A-A0AC-91F714E55EE4}"/>
               </a:ext>
             </a:extLst>
           </p:cNvPr>
@@ -4245,7 +4265,7 @@
           <p:cNvPr id="36" name="Straight Arrow Connector 35">
             <a:extLst>
               <a:ext uri="{FF2B5EF4-FFF2-40B4-BE49-F238E27FC236}">
-                <a16:creationId xmlns:a16="http://schemas.microsoft.com/office/drawing/2014/main" id="{42C17063-D3D5-4797-A7C1-735D7E590E1E}"/>
+                <a16:creationId xmlns:a16="http://schemas.microsoft.com/office/drawing/2014/main" xmlns="" id="{42C17063-D3D5-4797-A7C1-735D7E590E1E}"/>
               </a:ext>
             </a:extLst>
           </p:cNvPr>
@@ -4286,7 +4306,7 @@
           <p:cNvPr id="50" name="Straight Arrow Connector 49">
             <a:extLst>
               <a:ext uri="{FF2B5EF4-FFF2-40B4-BE49-F238E27FC236}">
-                <a16:creationId xmlns:a16="http://schemas.microsoft.com/office/drawing/2014/main" id="{DDCE01E4-3007-46F7-AD3D-7E0B6E48C62D}"/>
+                <a16:creationId xmlns:a16="http://schemas.microsoft.com/office/drawing/2014/main" xmlns="" id="{DDCE01E4-3007-46F7-AD3D-7E0B6E48C62D}"/>
               </a:ext>
             </a:extLst>
           </p:cNvPr>
@@ -4327,7 +4347,7 @@
           <p:cNvPr id="56" name="Straight Arrow Connector 55">
             <a:extLst>
               <a:ext uri="{FF2B5EF4-FFF2-40B4-BE49-F238E27FC236}">
-                <a16:creationId xmlns:a16="http://schemas.microsoft.com/office/drawing/2014/main" id="{73EAD4DE-61AB-4DB5-941E-B99807AA6131}"/>
+                <a16:creationId xmlns:a16="http://schemas.microsoft.com/office/drawing/2014/main" xmlns="" id="{73EAD4DE-61AB-4DB5-941E-B99807AA6131}"/>
               </a:ext>
             </a:extLst>
           </p:cNvPr>
@@ -4368,7 +4388,7 @@
           <p:cNvPr id="63" name="Straight Arrow Connector 62">
             <a:extLst>
               <a:ext uri="{FF2B5EF4-FFF2-40B4-BE49-F238E27FC236}">
-                <a16:creationId xmlns:a16="http://schemas.microsoft.com/office/drawing/2014/main" id="{59AB2FF6-8689-4953-AF06-439367B3BA22}"/>
+                <a16:creationId xmlns:a16="http://schemas.microsoft.com/office/drawing/2014/main" xmlns="" id="{59AB2FF6-8689-4953-AF06-439367B3BA22}"/>
               </a:ext>
             </a:extLst>
           </p:cNvPr>
@@ -4409,7 +4429,7 @@
           <p:cNvPr id="67" name="TextBox 66">
             <a:extLst>
               <a:ext uri="{FF2B5EF4-FFF2-40B4-BE49-F238E27FC236}">
-                <a16:creationId xmlns:a16="http://schemas.microsoft.com/office/drawing/2014/main" id="{D14F0DBF-BC35-4A50-8163-3062C137C1EF}"/>
+                <a16:creationId xmlns:a16="http://schemas.microsoft.com/office/drawing/2014/main" xmlns="" id="{D14F0DBF-BC35-4A50-8163-3062C137C1EF}"/>
               </a:ext>
             </a:extLst>
           </p:cNvPr>
@@ -4451,7 +4471,7 @@
           <p:cNvPr id="68" name="TextBox 67">
             <a:extLst>
               <a:ext uri="{FF2B5EF4-FFF2-40B4-BE49-F238E27FC236}">
-                <a16:creationId xmlns:a16="http://schemas.microsoft.com/office/drawing/2014/main" id="{36C659CC-53C8-42EF-83D9-D7F0F3B0E380}"/>
+                <a16:creationId xmlns:a16="http://schemas.microsoft.com/office/drawing/2014/main" xmlns="" id="{36C659CC-53C8-42EF-83D9-D7F0F3B0E380}"/>
               </a:ext>
             </a:extLst>
           </p:cNvPr>

</xml_diff>